<commit_message>
Added odp format for presentation
</commit_message>
<xml_diff>
--- a/ClassGraph.pptx
+++ b/ClassGraph.pptx
@@ -3537,7 +3537,7 @@
             </a:r>
             <a:r>
               <a:rPr lang="fr-FR" sz="1200" dirty="0" smtClean="0"/>
-              <a:t>-pointer</a:t>
+              <a:t>-index</a:t>
             </a:r>
             <a:endParaRPr lang="fr-FR" sz="1200" dirty="0"/>
           </a:p>
@@ -3587,12 +3587,16 @@
           <a:p>
             <a:pPr algn="ctr"/>
             <a:r>
-              <a:rPr lang="fr-FR" sz="1200" dirty="0" err="1" smtClean="0"/>
-              <a:t>Breath</a:t>
+              <a:rPr lang="fr-FR" sz="1200" smtClean="0"/>
+              <a:t>Breadth</a:t>
             </a:r>
             <a:r>
               <a:rPr lang="fr-FR" sz="1200" dirty="0" smtClean="0"/>
-              <a:t> first</a:t>
+              <a:t> </a:t>
+            </a:r>
+            <a:r>
+              <a:rPr lang="fr-FR" sz="1200" dirty="0" smtClean="0"/>
+              <a:t>first</a:t>
             </a:r>
             <a:endParaRPr lang="fr-FR" sz="1200" dirty="0"/>
           </a:p>

</xml_diff>